<commit_message>
Aktualisierung UML-Diagramme im Bericht.
</commit_message>
<xml_diff>
--- a/Praesentation/dbis_gruen_blau.pptx
+++ b/Praesentation/dbis_gruen_blau.pptx
@@ -9,34 +9,31 @@
     <p:sldMasterId id="2147483717" r:id="rId5"/>
   </p:sldMasterIdLst>
   <p:notesMasterIdLst>
-    <p:notesMasterId r:id="rId14"/>
+    <p:notesMasterId r:id="rId11"/>
   </p:notesMasterIdLst>
   <p:sldIdLst>
-    <p:sldId id="289" r:id="rId6"/>
-    <p:sldId id="373" r:id="rId7"/>
-    <p:sldId id="372" r:id="rId8"/>
-    <p:sldId id="369" r:id="rId9"/>
-    <p:sldId id="371" r:id="rId10"/>
-    <p:sldId id="374" r:id="rId11"/>
-    <p:sldId id="292" r:id="rId12"/>
-    <p:sldId id="347" r:id="rId13"/>
+    <p:sldId id="369" r:id="rId6"/>
+    <p:sldId id="371" r:id="rId7"/>
+    <p:sldId id="374" r:id="rId8"/>
+    <p:sldId id="292" r:id="rId9"/>
+    <p:sldId id="347" r:id="rId10"/>
   </p:sldIdLst>
   <p:sldSz cx="12192000" cy="6858000"/>
   <p:notesSz cx="6858000" cy="9144000"/>
   <p:embeddedFontLst>
     <p:embeddedFont>
       <p:font typeface="Calibri" panose="020F0502020204030204" pitchFamily="34" charset="0"/>
-      <p:regular r:id="rId15"/>
-      <p:bold r:id="rId16"/>
-      <p:italic r:id="rId17"/>
-      <p:boldItalic r:id="rId18"/>
+      <p:regular r:id="rId12"/>
+      <p:bold r:id="rId13"/>
+      <p:italic r:id="rId14"/>
+      <p:boldItalic r:id="rId15"/>
     </p:embeddedFont>
     <p:embeddedFont>
-      <p:font typeface="Frutiger LT Com 45 Light" panose="020B0403030504020204" pitchFamily="34" charset="0"/>
-      <p:regular r:id="rId19"/>
-      <p:bold r:id="rId20"/>
-      <p:italic r:id="rId21"/>
-      <p:boldItalic r:id="rId22"/>
+      <p:font typeface="Frutiger LT Com 45 Light" panose="020B0303030504090204" charset="0"/>
+      <p:regular r:id="rId16"/>
+      <p:bold r:id="rId17"/>
+      <p:italic r:id="rId18"/>
+      <p:boldItalic r:id="rId19"/>
     </p:embeddedFont>
   </p:embeddedFontLst>
   <p:defaultTextStyle>
@@ -250,7 +247,7 @@
           <a:p>
             <a:fld id="{FDCDBCAC-5F00-47F0-BBE7-4862A47AF8BE}" type="datetimeFigureOut">
               <a:rPr lang="de-DE" smtClean="0"/>
-              <a:t>30.08.2022</a:t>
+              <a:t>09.03.2023</a:t>
             </a:fld>
             <a:endParaRPr lang="de-DE" dirty="0"/>
           </a:p>
@@ -582,7 +579,7 @@
           <a:p>
             <a:fld id="{C899ADF2-3AF6-4B39-998B-734B61508636}" type="slidenum">
               <a:rPr lang="de-DE" smtClean="0"/>
-              <a:t>4</a:t>
+              <a:t>1</a:t>
             </a:fld>
             <a:endParaRPr lang="de-DE" dirty="0"/>
           </a:p>
@@ -4528,76 +4525,6 @@
       </p:sp>
       <p:sp>
         <p:nvSpPr>
-          <p:cNvPr id="17" name="Textfeld 16">
-            <a:extLst>
-              <a:ext uri="{FF2B5EF4-FFF2-40B4-BE49-F238E27FC236}">
-                <a16:creationId xmlns:a16="http://schemas.microsoft.com/office/drawing/2014/main" id="{11412622-88A7-4EA5-8D7F-4B064147B9D5}"/>
-              </a:ext>
-            </a:extLst>
-          </p:cNvPr>
-          <p:cNvSpPr txBox="1"/>
-          <p:nvPr userDrawn="1"/>
-        </p:nvSpPr>
-        <p:spPr>
-          <a:xfrm>
-            <a:off x="8758046" y="2857579"/>
-            <a:ext cx="3957006" cy="1723549"/>
-          </a:xfrm>
-          <a:prstGeom prst="rect">
-            <a:avLst/>
-          </a:prstGeom>
-          <a:noFill/>
-        </p:spPr>
-        <p:txBody>
-          <a:bodyPr wrap="square" rtlCol="0">
-            <a:spAutoFit/>
-          </a:bodyPr>
-          <a:lstStyle/>
-          <a:p>
-            <a:r>
-              <a:rPr lang="de-DE" dirty="0">
-                <a:solidFill>
-                  <a:schemeClr val="bg1"/>
-                </a:solidFill>
-              </a:rPr>
-              <a:t>Lehrgebiet Datenbanken und Informationssysteme</a:t>
-            </a:r>
-          </a:p>
-          <a:p>
-            <a:r>
-              <a:rPr lang="de-DE" sz="1600" i="1" dirty="0">
-                <a:solidFill>
-                  <a:schemeClr val="bg1"/>
-                </a:solidFill>
-              </a:rPr>
-              <a:t>https://www.fernuni-hagen.de/dbis/</a:t>
-            </a:r>
-          </a:p>
-          <a:p>
-            <a:endParaRPr lang="de-DE" dirty="0">
-              <a:solidFill>
-                <a:schemeClr val="bg1"/>
-              </a:solidFill>
-            </a:endParaRPr>
-          </a:p>
-          <a:p>
-            <a:endParaRPr lang="de-DE" dirty="0">
-              <a:solidFill>
-                <a:schemeClr val="bg1"/>
-              </a:solidFill>
-            </a:endParaRPr>
-          </a:p>
-          <a:p>
-            <a:endParaRPr lang="de-DE" dirty="0">
-              <a:solidFill>
-                <a:schemeClr val="bg1"/>
-              </a:solidFill>
-            </a:endParaRPr>
-          </a:p>
-        </p:txBody>
-      </p:sp>
-      <p:sp>
-        <p:nvSpPr>
           <p:cNvPr id="5" name="Textplatzhalter 4">
             <a:extLst>
               <a:ext uri="{FF2B5EF4-FFF2-40B4-BE49-F238E27FC236}">
@@ -4614,8 +4541,8 @@
         </p:nvSpPr>
         <p:spPr>
           <a:xfrm>
-            <a:off x="8640825" y="2148386"/>
-            <a:ext cx="2922587" cy="488526"/>
+            <a:off x="8859326" y="2148385"/>
+            <a:ext cx="2704086" cy="1712663"/>
           </a:xfrm>
         </p:spPr>
         <p:txBody>
@@ -4634,7 +4561,21 @@
             <a:pPr lvl="0"/>
             <a:r>
               <a:rPr lang="de-DE" dirty="0"/>
-              <a:t>  &lt;Name&gt;</a:t>
+              <a:t>Anne Koch</a:t>
+            </a:r>
+          </a:p>
+          <a:p>
+            <a:pPr lvl="0"/>
+            <a:r>
+              <a:rPr lang="de-DE" dirty="0"/>
+              <a:t>Clara Jansen</a:t>
+            </a:r>
+          </a:p>
+          <a:p>
+            <a:pPr lvl="0"/>
+            <a:r>
+              <a:rPr lang="de-DE" dirty="0"/>
+              <a:t>Dietrich Tönnies</a:t>
             </a:r>
           </a:p>
         </p:txBody>
@@ -6074,17 +6015,17 @@
                   </a:schemeClr>
                 </a:solidFill>
               </a:rPr>
-              <a:t>Chair of </a:t>
-            </a:r>
-            <a:r>
-              <a:rPr lang="de-DE" dirty="0">
+              <a:t>Lehrgebiet</a:t>
+            </a:r>
+            <a:r>
+              <a:rPr lang="de-DE" b="1" dirty="0">
                 <a:solidFill>
                   <a:schemeClr val="bg2">
                     <a:lumMod val="50000"/>
                   </a:schemeClr>
                 </a:solidFill>
               </a:rPr>
-              <a:t>Databases and Information Systems</a:t>
+              <a:t> Multimedia und Internetanwendungen</a:t>
             </a:r>
           </a:p>
         </p:txBody>
@@ -6455,7 +6396,7 @@
       </a:lvl9pPr>
     </p:otherStyle>
   </p:txStyles>
-  <p:extLst mod="1">
+  <p:extLst>
     <p:ext uri="{27BBF7A9-308A-43DC-89C8-2F10F3537804}">
       <p15:sldGuideLst xmlns:p15="http://schemas.microsoft.com/office/powerpoint/2012/main">
         <p15:guide id="1" orient="horz" pos="2160">
@@ -7415,7 +7356,7 @@
       </a:lvl9pPr>
     </p:otherStyle>
   </p:txStyles>
-  <p:extLst mod="1">
+  <p:extLst>
     <p:ext uri="{27BBF7A9-308A-43DC-89C8-2F10F3537804}">
       <p15:sldGuideLst xmlns:p15="http://schemas.microsoft.com/office/powerpoint/2012/main">
         <p15:guide id="1" orient="horz" pos="2160">
@@ -7929,18 +7870,22 @@
             <a:r>
               <a:rPr lang="de-DE" b="0" dirty="0">
                 <a:solidFill>
-                  <a:srgbClr val="5073A5"/>
+                  <a:schemeClr val="bg2">
+                    <a:lumMod val="50000"/>
+                  </a:schemeClr>
                 </a:solidFill>
               </a:rPr>
-              <a:t>Chair of </a:t>
-            </a:r>
-            <a:r>
-              <a:rPr lang="de-DE" dirty="0">
-                <a:solidFill>
-                  <a:srgbClr val="5073A5"/>
+              <a:t>Lehrgebiet</a:t>
+            </a:r>
+            <a:r>
+              <a:rPr lang="de-DE" b="1" dirty="0">
+                <a:solidFill>
+                  <a:schemeClr val="bg2">
+                    <a:lumMod val="50000"/>
+                  </a:schemeClr>
                 </a:solidFill>
               </a:rPr>
-              <a:t>Databases and Information Systems</a:t>
+              <a:t> Multimedia und Internetanwendungen</a:t>
             </a:r>
           </a:p>
         </p:txBody>
@@ -9651,352 +9596,6 @@
       </p:grpSpPr>
       <p:sp>
         <p:nvSpPr>
-          <p:cNvPr id="15" name="Titel 14">
-            <a:extLst>
-              <a:ext uri="{FF2B5EF4-FFF2-40B4-BE49-F238E27FC236}">
-                <a16:creationId xmlns:a16="http://schemas.microsoft.com/office/drawing/2014/main" id="{6FEF7212-40FB-4212-A093-380BE3E35339}"/>
-              </a:ext>
-            </a:extLst>
-          </p:cNvPr>
-          <p:cNvSpPr>
-            <a:spLocks noGrp="1"/>
-          </p:cNvSpPr>
-          <p:nvPr>
-            <p:ph type="ctrTitle"/>
-          </p:nvPr>
-        </p:nvSpPr>
-        <p:spPr/>
-        <p:txBody>
-          <a:bodyPr/>
-          <a:lstStyle/>
-          <a:p>
-            <a:endParaRPr lang="de-DE"/>
-          </a:p>
-        </p:txBody>
-      </p:sp>
-      <p:sp>
-        <p:nvSpPr>
-          <p:cNvPr id="16" name="Untertitel 15">
-            <a:extLst>
-              <a:ext uri="{FF2B5EF4-FFF2-40B4-BE49-F238E27FC236}">
-                <a16:creationId xmlns:a16="http://schemas.microsoft.com/office/drawing/2014/main" id="{0E48DD16-9232-47FD-B268-3B04434B6DF6}"/>
-              </a:ext>
-            </a:extLst>
-          </p:cNvPr>
-          <p:cNvSpPr>
-            <a:spLocks noGrp="1"/>
-          </p:cNvSpPr>
-          <p:nvPr>
-            <p:ph type="subTitle" idx="1"/>
-          </p:nvPr>
-        </p:nvSpPr>
-        <p:spPr/>
-        <p:txBody>
-          <a:bodyPr/>
-          <a:lstStyle/>
-          <a:p>
-            <a:endParaRPr lang="de-DE" dirty="0"/>
-          </a:p>
-        </p:txBody>
-      </p:sp>
-    </p:spTree>
-    <p:extLst>
-      <p:ext uri="{BB962C8B-B14F-4D97-AF65-F5344CB8AC3E}">
-        <p14:creationId xmlns:p14="http://schemas.microsoft.com/office/powerpoint/2010/main" val="516902193"/>
-      </p:ext>
-    </p:extLst>
-  </p:cSld>
-  <p:clrMapOvr>
-    <a:masterClrMapping/>
-  </p:clrMapOvr>
-</p:sld>
-</file>
-
-<file path=ppt/slides/slide2.xml><?xml version="1.0" encoding="utf-8"?>
-<p:sld xmlns:a="http://schemas.openxmlformats.org/drawingml/2006/main" xmlns:r="http://schemas.openxmlformats.org/officeDocument/2006/relationships" xmlns:p="http://schemas.openxmlformats.org/presentationml/2006/main">
-  <p:cSld>
-    <p:spTree>
-      <p:nvGrpSpPr>
-        <p:cNvPr id="1" name=""/>
-        <p:cNvGrpSpPr/>
-        <p:nvPr/>
-      </p:nvGrpSpPr>
-      <p:grpSpPr>
-        <a:xfrm>
-          <a:off x="0" y="0"/>
-          <a:ext cx="0" cy="0"/>
-          <a:chOff x="0" y="0"/>
-          <a:chExt cx="0" cy="0"/>
-        </a:xfrm>
-      </p:grpSpPr>
-      <p:sp>
-        <p:nvSpPr>
-          <p:cNvPr id="3" name="Titel 2">
-            <a:extLst>
-              <a:ext uri="{FF2B5EF4-FFF2-40B4-BE49-F238E27FC236}">
-                <a16:creationId xmlns:a16="http://schemas.microsoft.com/office/drawing/2014/main" id="{A6278B7C-B042-4F80-B27F-557A7379B5C0}"/>
-              </a:ext>
-            </a:extLst>
-          </p:cNvPr>
-          <p:cNvSpPr>
-            <a:spLocks noGrp="1"/>
-          </p:cNvSpPr>
-          <p:nvPr>
-            <p:ph type="title"/>
-          </p:nvPr>
-        </p:nvSpPr>
-        <p:spPr/>
-        <p:txBody>
-          <a:bodyPr/>
-          <a:lstStyle/>
-          <a:p>
-            <a:endParaRPr lang="de-DE"/>
-          </a:p>
-        </p:txBody>
-      </p:sp>
-      <p:sp>
-        <p:nvSpPr>
-          <p:cNvPr id="4" name="Inhaltsplatzhalter 3">
-            <a:extLst>
-              <a:ext uri="{FF2B5EF4-FFF2-40B4-BE49-F238E27FC236}">
-                <a16:creationId xmlns:a16="http://schemas.microsoft.com/office/drawing/2014/main" id="{B73265BE-313D-44D5-85E8-9D067CD111B2}"/>
-              </a:ext>
-            </a:extLst>
-          </p:cNvPr>
-          <p:cNvSpPr>
-            <a:spLocks noGrp="1"/>
-          </p:cNvSpPr>
-          <p:nvPr>
-            <p:ph idx="1"/>
-          </p:nvPr>
-        </p:nvSpPr>
-        <p:spPr/>
-        <p:txBody>
-          <a:bodyPr/>
-          <a:lstStyle/>
-          <a:p>
-            <a:endParaRPr lang="de-DE"/>
-          </a:p>
-        </p:txBody>
-      </p:sp>
-      <p:sp>
-        <p:nvSpPr>
-          <p:cNvPr id="5" name="Fußzeilenplatzhalter 4">
-            <a:extLst>
-              <a:ext uri="{FF2B5EF4-FFF2-40B4-BE49-F238E27FC236}">
-                <a16:creationId xmlns:a16="http://schemas.microsoft.com/office/drawing/2014/main" id="{1C9731A6-684B-4A63-B15A-9BDF99C98083}"/>
-              </a:ext>
-            </a:extLst>
-          </p:cNvPr>
-          <p:cNvSpPr>
-            <a:spLocks noGrp="1"/>
-          </p:cNvSpPr>
-          <p:nvPr>
-            <p:ph type="ftr" sz="quarter" idx="11"/>
-          </p:nvPr>
-        </p:nvSpPr>
-        <p:spPr/>
-        <p:txBody>
-          <a:bodyPr/>
-          <a:lstStyle/>
-          <a:p>
-            <a:r>
-              <a:rPr lang="en-US"/>
-              <a:t>Fußzeile</a:t>
-            </a:r>
-            <a:endParaRPr lang="de-DE" dirty="0"/>
-          </a:p>
-        </p:txBody>
-      </p:sp>
-      <p:sp>
-        <p:nvSpPr>
-          <p:cNvPr id="6" name="Foliennummernplatzhalter 5">
-            <a:extLst>
-              <a:ext uri="{FF2B5EF4-FFF2-40B4-BE49-F238E27FC236}">
-                <a16:creationId xmlns:a16="http://schemas.microsoft.com/office/drawing/2014/main" id="{A6F1EB15-5320-4289-A59F-0ED9DF7BB89F}"/>
-              </a:ext>
-            </a:extLst>
-          </p:cNvPr>
-          <p:cNvSpPr>
-            <a:spLocks noGrp="1"/>
-          </p:cNvSpPr>
-          <p:nvPr>
-            <p:ph type="sldNum" sz="quarter" idx="12"/>
-          </p:nvPr>
-        </p:nvSpPr>
-        <p:spPr/>
-        <p:txBody>
-          <a:bodyPr/>
-          <a:lstStyle/>
-          <a:p>
-            <a:fld id="{242EEE4B-4F13-4B3B-896D-98344C2D1A3F}" type="slidenum">
-              <a:rPr lang="de-DE" smtClean="0"/>
-              <a:t>2</a:t>
-            </a:fld>
-            <a:endParaRPr lang="de-DE" dirty="0"/>
-          </a:p>
-        </p:txBody>
-      </p:sp>
-    </p:spTree>
-    <p:extLst>
-      <p:ext uri="{BB962C8B-B14F-4D97-AF65-F5344CB8AC3E}">
-        <p14:creationId xmlns:p14="http://schemas.microsoft.com/office/powerpoint/2010/main" val="3929831998"/>
-      </p:ext>
-    </p:extLst>
-  </p:cSld>
-  <p:clrMapOvr>
-    <a:masterClrMapping/>
-  </p:clrMapOvr>
-</p:sld>
-</file>
-
-<file path=ppt/slides/slide3.xml><?xml version="1.0" encoding="utf-8"?>
-<p:sld xmlns:a="http://schemas.openxmlformats.org/drawingml/2006/main" xmlns:r="http://schemas.openxmlformats.org/officeDocument/2006/relationships" xmlns:p="http://schemas.openxmlformats.org/presentationml/2006/main">
-  <p:cSld>
-    <p:spTree>
-      <p:nvGrpSpPr>
-        <p:cNvPr id="1" name=""/>
-        <p:cNvGrpSpPr/>
-        <p:nvPr/>
-      </p:nvGrpSpPr>
-      <p:grpSpPr>
-        <a:xfrm>
-          <a:off x="0" y="0"/>
-          <a:ext cx="0" cy="0"/>
-          <a:chOff x="0" y="0"/>
-          <a:chExt cx="0" cy="0"/>
-        </a:xfrm>
-      </p:grpSpPr>
-      <p:sp>
-        <p:nvSpPr>
-          <p:cNvPr id="2" name="Textplatzhalter 1">
-            <a:extLst>
-              <a:ext uri="{FF2B5EF4-FFF2-40B4-BE49-F238E27FC236}">
-                <a16:creationId xmlns:a16="http://schemas.microsoft.com/office/drawing/2014/main" id="{6A3FB4D0-721A-41BB-BBBE-12F8C7FA86AB}"/>
-              </a:ext>
-            </a:extLst>
-          </p:cNvPr>
-          <p:cNvSpPr>
-            <a:spLocks noGrp="1"/>
-          </p:cNvSpPr>
-          <p:nvPr>
-            <p:ph type="body" sz="quarter" idx="10"/>
-          </p:nvPr>
-        </p:nvSpPr>
-        <p:spPr/>
-        <p:txBody>
-          <a:bodyPr/>
-          <a:lstStyle/>
-          <a:p>
-            <a:endParaRPr lang="de-DE"/>
-          </a:p>
-        </p:txBody>
-      </p:sp>
-      <p:pic>
-        <p:nvPicPr>
-          <p:cNvPr id="12" name="Graphic 4" descr="Puzzleteile Silhouette">
-            <a:extLst>
-              <a:ext uri="{FF2B5EF4-FFF2-40B4-BE49-F238E27FC236}">
-                <a16:creationId xmlns:a16="http://schemas.microsoft.com/office/drawing/2014/main" id="{B2B2AFF5-4DE6-4C3F-8538-4823B00593B2}"/>
-              </a:ext>
-            </a:extLst>
-          </p:cNvPr>
-          <p:cNvPicPr>
-            <a:picLocks noChangeAspect="1"/>
-          </p:cNvPicPr>
-          <p:nvPr/>
-        </p:nvPicPr>
-        <p:blipFill>
-          <a:blip r:embed="rId2">
-            <a:extLst>
-              <a:ext uri="{96DAC541-7B7A-43D3-8B79-37D633B846F1}">
-                <asvg:svgBlip xmlns:asvg="http://schemas.microsoft.com/office/drawing/2016/SVG/main" r:embed="rId3"/>
-              </a:ext>
-            </a:extLst>
-          </a:blip>
-          <a:stretch>
-            <a:fillRect/>
-          </a:stretch>
-        </p:blipFill>
-        <p:spPr>
-          <a:xfrm>
-            <a:off x="3071664" y="1358541"/>
-            <a:ext cx="1972455" cy="1972455"/>
-          </a:xfrm>
-          <a:prstGeom prst="rect">
-            <a:avLst/>
-          </a:prstGeom>
-        </p:spPr>
-      </p:pic>
-      <p:sp>
-        <p:nvSpPr>
-          <p:cNvPr id="13" name="Textfeld 12">
-            <a:extLst>
-              <a:ext uri="{FF2B5EF4-FFF2-40B4-BE49-F238E27FC236}">
-                <a16:creationId xmlns:a16="http://schemas.microsoft.com/office/drawing/2014/main" id="{5B2FF1B6-F9EC-46F8-A0BC-329647BEF336}"/>
-              </a:ext>
-            </a:extLst>
-          </p:cNvPr>
-          <p:cNvSpPr txBox="1"/>
-          <p:nvPr/>
-        </p:nvSpPr>
-        <p:spPr>
-          <a:xfrm>
-            <a:off x="2050592" y="3330996"/>
-            <a:ext cx="4014598" cy="461665"/>
-          </a:xfrm>
-          <a:prstGeom prst="rect">
-            <a:avLst/>
-          </a:prstGeom>
-          <a:noFill/>
-        </p:spPr>
-        <p:txBody>
-          <a:bodyPr wrap="square" rtlCol="0">
-            <a:spAutoFit/>
-          </a:bodyPr>
-          <a:lstStyle/>
-          <a:p>
-            <a:pPr algn="ctr"/>
-            <a:r>
-              <a:rPr lang="de-DE" sz="2400" dirty="0"/>
-              <a:t>Abschlussgrafik</a:t>
-            </a:r>
-            <a:endParaRPr lang="de-DE" sz="2000" dirty="0"/>
-          </a:p>
-        </p:txBody>
-      </p:sp>
-    </p:spTree>
-    <p:extLst>
-      <p:ext uri="{BB962C8B-B14F-4D97-AF65-F5344CB8AC3E}">
-        <p14:creationId xmlns:p14="http://schemas.microsoft.com/office/powerpoint/2010/main" val="3464374872"/>
-      </p:ext>
-    </p:extLst>
-  </p:cSld>
-  <p:clrMapOvr>
-    <a:masterClrMapping/>
-  </p:clrMapOvr>
-</p:sld>
-</file>
-
-<file path=ppt/slides/slide4.xml><?xml version="1.0" encoding="utf-8"?>
-<p:sld xmlns:a="http://schemas.openxmlformats.org/drawingml/2006/main" xmlns:r="http://schemas.openxmlformats.org/officeDocument/2006/relationships" xmlns:p="http://schemas.openxmlformats.org/presentationml/2006/main">
-  <p:cSld>
-    <p:spTree>
-      <p:nvGrpSpPr>
-        <p:cNvPr id="1" name=""/>
-        <p:cNvGrpSpPr/>
-        <p:nvPr/>
-      </p:nvGrpSpPr>
-      <p:grpSpPr>
-        <a:xfrm>
-          <a:off x="0" y="0"/>
-          <a:ext cx="0" cy="0"/>
-          <a:chOff x="0" y="0"/>
-          <a:chExt cx="0" cy="0"/>
-        </a:xfrm>
-      </p:grpSpPr>
-      <p:sp>
-        <p:nvSpPr>
           <p:cNvPr id="5" name="Titel 4">
             <a:extLst>
               <a:ext uri="{FF2B5EF4-FFF2-40B4-BE49-F238E27FC236}">
@@ -10018,7 +9617,7 @@
           <a:p>
             <a:r>
               <a:rPr lang="de-DE" dirty="0"/>
-              <a:t>Vorlage blau</a:t>
+              <a:t>Automatische Erstellung einer Wissensrepräsentation aus einem medizinischen Text</a:t>
             </a:r>
           </a:p>
         </p:txBody>
@@ -10045,8 +9644,16 @@
           <a:lstStyle/>
           <a:p>
             <a:r>
-              <a:rPr lang="de-DE"/>
-              <a:t>Mit Agenda-Balken</a:t>
+              <a:rPr lang="de-DE" b="1" dirty="0"/>
+              <a:t>Fachpraktikum Natural Language Processing, Information </a:t>
+            </a:r>
+            <a:r>
+              <a:rPr lang="de-DE" b="1" dirty="0" err="1"/>
+              <a:t>Extraction</a:t>
+            </a:r>
+            <a:r>
+              <a:rPr lang="de-DE" b="1" dirty="0"/>
+              <a:t> und Retrieval (01589)</a:t>
             </a:r>
           </a:p>
         </p:txBody>
@@ -10088,26 +9695,18 @@
                   <a:schemeClr val="bg1"/>
                 </a:solidFill>
               </a:rPr>
-              <a:t>Faculty of</a:t>
+              <a:t>Fakultät für</a:t>
             </a:r>
           </a:p>
           <a:p>
             <a:pPr algn="r"/>
             <a:r>
-              <a:rPr lang="de-DE" sz="1600" b="1" dirty="0" err="1">
+              <a:rPr lang="de-DE" sz="1600" b="1" dirty="0">
                 <a:solidFill>
                   <a:schemeClr val="bg1"/>
                 </a:solidFill>
               </a:rPr>
-              <a:t>Mathematics</a:t>
-            </a:r>
-            <a:r>
-              <a:rPr lang="de-DE" sz="1600" b="1" dirty="0">
-                <a:solidFill>
-                  <a:schemeClr val="bg1"/>
-                </a:solidFill>
-              </a:rPr>
-              <a:t> and</a:t>
+              <a:t>Mathematik und</a:t>
             </a:r>
             <a:br>
               <a:rPr lang="de-DE" sz="1600" b="1" dirty="0">
@@ -10122,7 +9721,7 @@
                   <a:schemeClr val="bg1"/>
                 </a:solidFill>
               </a:rPr>
-              <a:t>Computer Science</a:t>
+              <a:t>Informatik</a:t>
             </a:r>
           </a:p>
           <a:p>
@@ -10148,7 +9747,7 @@
 </p:sld>
 </file>
 
-<file path=ppt/slides/slide5.xml><?xml version="1.0" encoding="utf-8"?>
+<file path=ppt/slides/slide2.xml><?xml version="1.0" encoding="utf-8"?>
 <p:sld xmlns:a="http://schemas.openxmlformats.org/drawingml/2006/main" xmlns:r="http://schemas.openxmlformats.org/officeDocument/2006/relationships" xmlns:p="http://schemas.openxmlformats.org/presentationml/2006/main">
   <p:cSld>
     <p:spTree>
@@ -10511,7 +10110,7 @@
             <a:fld id="{242EEE4B-4F13-4B3B-896D-98344C2D1A3F}" type="slidenum">
               <a:rPr lang="de-DE" smtClean="0"/>
               <a:pPr/>
-              <a:t>5</a:t>
+              <a:t>2</a:t>
             </a:fld>
             <a:endParaRPr lang="de-DE" dirty="0"/>
           </a:p>
@@ -10530,7 +10129,7 @@
 </p:sld>
 </file>
 
-<file path=ppt/slides/slide6.xml><?xml version="1.0" encoding="utf-8"?>
+<file path=ppt/slides/slide3.xml><?xml version="1.0" encoding="utf-8"?>
 <p:sld xmlns:a="http://schemas.openxmlformats.org/drawingml/2006/main" xmlns:r="http://schemas.openxmlformats.org/officeDocument/2006/relationships" xmlns:p="http://schemas.openxmlformats.org/presentationml/2006/main">
   <p:cSld>
     <p:spTree>
@@ -10596,7 +10195,7 @@
           <a:bodyPr/>
           <a:lstStyle/>
           <a:p>
-            <a:endParaRPr lang="de-DE"/>
+            <a:endParaRPr lang="de-DE" dirty="0"/>
           </a:p>
         </p:txBody>
       </p:sp>
@@ -10657,7 +10256,7 @@
             <a:fld id="{242EEE4B-4F13-4B3B-896D-98344C2D1A3F}" type="slidenum">
               <a:rPr lang="de-DE" smtClean="0"/>
               <a:pPr/>
-              <a:t>6</a:t>
+              <a:t>3</a:t>
             </a:fld>
             <a:endParaRPr lang="de-DE" dirty="0"/>
           </a:p>
@@ -10980,7 +10579,7 @@
 </p:sld>
 </file>
 
-<file path=ppt/slides/slide7.xml><?xml version="1.0" encoding="utf-8"?>
+<file path=ppt/slides/slide4.xml><?xml version="1.0" encoding="utf-8"?>
 <p:sld xmlns:a="http://schemas.openxmlformats.org/drawingml/2006/main" xmlns:r="http://schemas.openxmlformats.org/officeDocument/2006/relationships" xmlns:p="http://schemas.openxmlformats.org/presentationml/2006/main">
   <p:cSld>
     <p:spTree>
@@ -11018,7 +10617,7 @@
           <a:bodyPr/>
           <a:lstStyle/>
           <a:p>
-            <a:endParaRPr lang="de-DE"/>
+            <a:endParaRPr lang="de-DE" dirty="0"/>
           </a:p>
         </p:txBody>
       </p:sp>
@@ -11301,7 +10900,7 @@
 </p:sld>
 </file>
 
-<file path=ppt/slides/slide8.xml><?xml version="1.0" encoding="utf-8"?>
+<file path=ppt/slides/slide5.xml><?xml version="1.0" encoding="utf-8"?>
 <p:sld xmlns:a="http://schemas.openxmlformats.org/drawingml/2006/main" xmlns:r="http://schemas.openxmlformats.org/officeDocument/2006/relationships" xmlns:p="http://schemas.openxmlformats.org/presentationml/2006/main">
   <p:cSld>
     <p:spTree>

</xml_diff>